<commit_message>
Updated Figures and Supp Tables/Figures
</commit_message>
<xml_diff>
--- a/figures/Supplementary Figures.pptx
+++ b/figures/Supplementary Figures.pptx
@@ -7,9 +7,11 @@
   <p:sldIdLst>
     <p:sldId id="258" r:id="rId2"/>
     <p:sldId id="256" r:id="rId3"/>
-    <p:sldId id="257" r:id="rId4"/>
-    <p:sldId id="259" r:id="rId5"/>
-    <p:sldId id="260" r:id="rId6"/>
+    <p:sldId id="263" r:id="rId4"/>
+    <p:sldId id="261" r:id="rId5"/>
+    <p:sldId id="257" r:id="rId6"/>
+    <p:sldId id="262" r:id="rId7"/>
+    <p:sldId id="259" r:id="rId8"/>
   </p:sldIdLst>
   <p:sldSz cx="6858000" cy="9906000" type="A4"/>
   <p:notesSz cx="6858000" cy="9144000"/>
@@ -292,7 +294,7 @@
           <a:p>
             <a:fld id="{C30DDD98-3366-1D4C-B4C0-717E2A404DFA}" type="datetimeFigureOut">
               <a:rPr lang="en-US" smtClean="0"/>
-              <a:t>07/03/2015</a:t>
+              <a:t>26/05/2015</a:t>
             </a:fld>
             <a:endParaRPr lang="en-US"/>
           </a:p>
@@ -462,7 +464,7 @@
           <a:p>
             <a:fld id="{C30DDD98-3366-1D4C-B4C0-717E2A404DFA}" type="datetimeFigureOut">
               <a:rPr lang="en-US" smtClean="0"/>
-              <a:t>07/03/2015</a:t>
+              <a:t>26/05/2015</a:t>
             </a:fld>
             <a:endParaRPr lang="en-US"/>
           </a:p>
@@ -642,7 +644,7 @@
           <a:p>
             <a:fld id="{C30DDD98-3366-1D4C-B4C0-717E2A404DFA}" type="datetimeFigureOut">
               <a:rPr lang="en-US" smtClean="0"/>
-              <a:t>07/03/2015</a:t>
+              <a:t>26/05/2015</a:t>
             </a:fld>
             <a:endParaRPr lang="en-US"/>
           </a:p>
@@ -812,7 +814,7 @@
           <a:p>
             <a:fld id="{C30DDD98-3366-1D4C-B4C0-717E2A404DFA}" type="datetimeFigureOut">
               <a:rPr lang="en-US" smtClean="0"/>
-              <a:t>07/03/2015</a:t>
+              <a:t>26/05/2015</a:t>
             </a:fld>
             <a:endParaRPr lang="en-US"/>
           </a:p>
@@ -1058,7 +1060,7 @@
           <a:p>
             <a:fld id="{C30DDD98-3366-1D4C-B4C0-717E2A404DFA}" type="datetimeFigureOut">
               <a:rPr lang="en-US" smtClean="0"/>
-              <a:t>07/03/2015</a:t>
+              <a:t>26/05/2015</a:t>
             </a:fld>
             <a:endParaRPr lang="en-US"/>
           </a:p>
@@ -1346,7 +1348,7 @@
           <a:p>
             <a:fld id="{C30DDD98-3366-1D4C-B4C0-717E2A404DFA}" type="datetimeFigureOut">
               <a:rPr lang="en-US" smtClean="0"/>
-              <a:t>07/03/2015</a:t>
+              <a:t>26/05/2015</a:t>
             </a:fld>
             <a:endParaRPr lang="en-US"/>
           </a:p>
@@ -1773,7 +1775,7 @@
           <a:p>
             <a:fld id="{C30DDD98-3366-1D4C-B4C0-717E2A404DFA}" type="datetimeFigureOut">
               <a:rPr lang="en-US" smtClean="0"/>
-              <a:t>07/03/2015</a:t>
+              <a:t>26/05/2015</a:t>
             </a:fld>
             <a:endParaRPr lang="en-US"/>
           </a:p>
@@ -1891,7 +1893,7 @@
           <a:p>
             <a:fld id="{C30DDD98-3366-1D4C-B4C0-717E2A404DFA}" type="datetimeFigureOut">
               <a:rPr lang="en-US" smtClean="0"/>
-              <a:t>07/03/2015</a:t>
+              <a:t>26/05/2015</a:t>
             </a:fld>
             <a:endParaRPr lang="en-US"/>
           </a:p>
@@ -1986,7 +1988,7 @@
           <a:p>
             <a:fld id="{C30DDD98-3366-1D4C-B4C0-717E2A404DFA}" type="datetimeFigureOut">
               <a:rPr lang="en-US" smtClean="0"/>
-              <a:t>07/03/2015</a:t>
+              <a:t>26/05/2015</a:t>
             </a:fld>
             <a:endParaRPr lang="en-US"/>
           </a:p>
@@ -2263,7 +2265,7 @@
           <a:p>
             <a:fld id="{C30DDD98-3366-1D4C-B4C0-717E2A404DFA}" type="datetimeFigureOut">
               <a:rPr lang="en-US" smtClean="0"/>
-              <a:t>07/03/2015</a:t>
+              <a:t>26/05/2015</a:t>
             </a:fld>
             <a:endParaRPr lang="en-US"/>
           </a:p>
@@ -2516,7 +2518,7 @@
           <a:p>
             <a:fld id="{C30DDD98-3366-1D4C-B4C0-717E2A404DFA}" type="datetimeFigureOut">
               <a:rPr lang="en-US" smtClean="0"/>
-              <a:t>07/03/2015</a:t>
+              <a:t>26/05/2015</a:t>
             </a:fld>
             <a:endParaRPr lang="en-US"/>
           </a:p>
@@ -2729,7 +2731,7 @@
           <a:p>
             <a:fld id="{C30DDD98-3366-1D4C-B4C0-717E2A404DFA}" type="datetimeFigureOut">
               <a:rPr lang="en-US" smtClean="0"/>
-              <a:t>07/03/2015</a:t>
+              <a:t>26/05/2015</a:t>
             </a:fld>
             <a:endParaRPr lang="en-US"/>
           </a:p>
@@ -3106,15 +3108,20 @@
       </p:grpSpPr>
       <p:sp>
         <p:nvSpPr>
-          <p:cNvPr id="8" name="Title 7"/>
-          <p:cNvSpPr>
-            <a:spLocks noGrp="1"/>
-          </p:cNvSpPr>
-          <p:nvPr>
-            <p:ph type="title"/>
-          </p:nvPr>
-        </p:nvSpPr>
-        <p:spPr/>
+          <p:cNvPr id="7" name="Text Placeholder 6"/>
+          <p:cNvSpPr>
+            <a:spLocks noGrp="1"/>
+          </p:cNvSpPr>
+          <p:nvPr>
+            <p:ph type="body" sz="half" idx="2"/>
+          </p:nvPr>
+        </p:nvSpPr>
+        <p:spPr>
+          <a:xfrm>
+            <a:off x="207818" y="8691517"/>
+            <a:ext cx="6257636" cy="1162578"/>
+          </a:xfrm>
+        </p:spPr>
         <p:txBody>
           <a:bodyPr>
             <a:normAutofit/>
@@ -3122,23 +3129,55 @@
           <a:lstStyle/>
           <a:p>
             <a:r>
-              <a:rPr lang="en-US" sz="2000" dirty="0" smtClean="0"/>
-              <a:t>Supplementary Figure 1</a:t>
+              <a:rPr lang="en-US" sz="1200" b="1" dirty="0" smtClean="0"/>
+              <a:t>Supplementary </a:t>
+            </a:r>
+            <a:r>
+              <a:rPr lang="en-US" sz="1200" b="1" smtClean="0"/>
+              <a:t>Figure S1</a:t>
+            </a:r>
+            <a:r>
+              <a:rPr lang="en-US" sz="1200" b="1" dirty="0" smtClean="0"/>
+              <a:t/>
             </a:r>
             <a:br>
-              <a:rPr lang="en-US" sz="2000" dirty="0" smtClean="0"/>
+              <a:rPr lang="en-US" sz="1200" b="1" dirty="0" smtClean="0"/>
             </a:br>
             <a:r>
-              <a:rPr lang="en-US" sz="2000" dirty="0" smtClean="0"/>
-              <a:t>Additional metrics for prognostic accuracy</a:t>
-            </a:r>
-            <a:endParaRPr lang="en-US" sz="2000" dirty="0"/>
+              <a:rPr lang="en-US" sz="1200" dirty="0" smtClean="0"/>
+              <a:t>Additional </a:t>
+            </a:r>
+            <a:r>
+              <a:rPr lang="en-US" sz="1200" dirty="0"/>
+              <a:t>metrics for </a:t>
+            </a:r>
+            <a:r>
+              <a:rPr lang="en-US" sz="1200" dirty="0" smtClean="0"/>
+              <a:t>prognostic accuracy. a) Brier score. b) </a:t>
+            </a:r>
+            <a:r>
+              <a:rPr lang="en-US" sz="1200" dirty="0" err="1" smtClean="0"/>
+              <a:t>Generalised</a:t>
+            </a:r>
+            <a:r>
+              <a:rPr lang="en-US" sz="1200" dirty="0" smtClean="0"/>
+              <a:t> R</a:t>
+            </a:r>
+            <a:r>
+              <a:rPr lang="en-US" sz="1200" baseline="30000" dirty="0" smtClean="0"/>
+              <a:t>2</a:t>
+            </a:r>
+            <a:r>
+              <a:rPr lang="en-US" sz="1200" dirty="0" smtClean="0"/>
+              <a:t> estimate of explained variation. c) Uno’s concordance estimate. d) Time-dependent area under the receiver operating characteristic curve AUC. Values shows are for 100 random cross-validation splits.</a:t>
+            </a:r>
+            <a:endParaRPr lang="en-US" sz="1200" dirty="0"/>
           </a:p>
         </p:txBody>
       </p:sp>
       <p:pic>
         <p:nvPicPr>
-          <p:cNvPr id="2" name="Picture 1"/>
+          <p:cNvPr id="9" name="Picture 8"/>
           <p:cNvPicPr>
             <a:picLocks noChangeAspect="1"/>
           </p:cNvPicPr>
@@ -3152,8 +3191,8 @@
         </p:blipFill>
         <p:spPr>
           <a:xfrm>
-            <a:off x="342900" y="2375088"/>
-            <a:ext cx="3194860" cy="3194860"/>
+            <a:off x="207818" y="1200727"/>
+            <a:ext cx="3074554" cy="3074554"/>
           </a:xfrm>
           <a:prstGeom prst="rect">
             <a:avLst/>
@@ -3162,7 +3201,7 @@
       </p:pic>
       <p:pic>
         <p:nvPicPr>
-          <p:cNvPr id="3" name="Picture 2"/>
+          <p:cNvPr id="10" name="Picture 9"/>
           <p:cNvPicPr>
             <a:picLocks noChangeAspect="1"/>
           </p:cNvPicPr>
@@ -3176,8 +3215,8 @@
         </p:blipFill>
         <p:spPr>
           <a:xfrm>
-            <a:off x="3814070" y="2868918"/>
-            <a:ext cx="2701030" cy="2701030"/>
+            <a:off x="3282372" y="1200727"/>
+            <a:ext cx="3074554" cy="3074554"/>
           </a:xfrm>
           <a:prstGeom prst="rect">
             <a:avLst/>
@@ -3186,7 +3225,7 @@
       </p:pic>
       <p:pic>
         <p:nvPicPr>
-          <p:cNvPr id="5" name="Picture 4"/>
+          <p:cNvPr id="11" name="Picture 10"/>
           <p:cNvPicPr>
             <a:picLocks noChangeAspect="1"/>
           </p:cNvPicPr>
@@ -3200,8 +3239,8 @@
         </p:blipFill>
         <p:spPr>
           <a:xfrm>
-            <a:off x="342900" y="6231668"/>
-            <a:ext cx="2795093" cy="2795093"/>
+            <a:off x="207818" y="4614719"/>
+            <a:ext cx="3074554" cy="3074554"/>
           </a:xfrm>
           <a:prstGeom prst="rect">
             <a:avLst/>
@@ -3210,7 +3249,7 @@
       </p:pic>
       <p:pic>
         <p:nvPicPr>
-          <p:cNvPr id="6" name="Picture 5"/>
+          <p:cNvPr id="12" name="Picture 11"/>
           <p:cNvPicPr>
             <a:picLocks noChangeAspect="1"/>
           </p:cNvPicPr>
@@ -3224,14 +3263,134 @@
         </p:blipFill>
         <p:spPr>
           <a:xfrm>
-            <a:off x="3537760" y="6208152"/>
-            <a:ext cx="2977340" cy="2977340"/>
+            <a:off x="3282372" y="4614719"/>
+            <a:ext cx="3074554" cy="3074554"/>
           </a:xfrm>
           <a:prstGeom prst="rect">
             <a:avLst/>
           </a:prstGeom>
         </p:spPr>
       </p:pic>
+      <p:sp>
+        <p:nvSpPr>
+          <p:cNvPr id="13" name="TextBox 12"/>
+          <p:cNvSpPr txBox="1"/>
+          <p:nvPr/>
+        </p:nvSpPr>
+        <p:spPr>
+          <a:xfrm>
+            <a:off x="207818" y="1056490"/>
+            <a:ext cx="295236" cy="369332"/>
+          </a:xfrm>
+          <a:prstGeom prst="rect">
+            <a:avLst/>
+          </a:prstGeom>
+          <a:noFill/>
+        </p:spPr>
+        <p:txBody>
+          <a:bodyPr wrap="none" rtlCol="0">
+            <a:spAutoFit/>
+          </a:bodyPr>
+          <a:lstStyle/>
+          <a:p>
+            <a:r>
+              <a:rPr lang="en-US" dirty="0" smtClean="0"/>
+              <a:t>a</a:t>
+            </a:r>
+            <a:endParaRPr lang="en-US" dirty="0"/>
+          </a:p>
+        </p:txBody>
+      </p:sp>
+      <p:sp>
+        <p:nvSpPr>
+          <p:cNvPr id="14" name="TextBox 13"/>
+          <p:cNvSpPr txBox="1"/>
+          <p:nvPr/>
+        </p:nvSpPr>
+        <p:spPr>
+          <a:xfrm>
+            <a:off x="3134754" y="1056490"/>
+            <a:ext cx="305943" cy="369332"/>
+          </a:xfrm>
+          <a:prstGeom prst="rect">
+            <a:avLst/>
+          </a:prstGeom>
+          <a:noFill/>
+        </p:spPr>
+        <p:txBody>
+          <a:bodyPr wrap="none" rtlCol="0">
+            <a:spAutoFit/>
+          </a:bodyPr>
+          <a:lstStyle/>
+          <a:p>
+            <a:r>
+              <a:rPr lang="en-US" dirty="0" smtClean="0"/>
+              <a:t>b</a:t>
+            </a:r>
+            <a:endParaRPr lang="en-US" dirty="0"/>
+          </a:p>
+        </p:txBody>
+      </p:sp>
+      <p:sp>
+        <p:nvSpPr>
+          <p:cNvPr id="15" name="TextBox 14"/>
+          <p:cNvSpPr txBox="1"/>
+          <p:nvPr/>
+        </p:nvSpPr>
+        <p:spPr>
+          <a:xfrm>
+            <a:off x="207818" y="4430053"/>
+            <a:ext cx="282274" cy="369332"/>
+          </a:xfrm>
+          <a:prstGeom prst="rect">
+            <a:avLst/>
+          </a:prstGeom>
+          <a:noFill/>
+        </p:spPr>
+        <p:txBody>
+          <a:bodyPr wrap="none" rtlCol="0">
+            <a:spAutoFit/>
+          </a:bodyPr>
+          <a:lstStyle/>
+          <a:p>
+            <a:r>
+              <a:rPr lang="en-US" dirty="0" smtClean="0"/>
+              <a:t>c</a:t>
+            </a:r>
+            <a:endParaRPr lang="en-US" dirty="0"/>
+          </a:p>
+        </p:txBody>
+      </p:sp>
+      <p:sp>
+        <p:nvSpPr>
+          <p:cNvPr id="16" name="TextBox 15"/>
+          <p:cNvSpPr txBox="1"/>
+          <p:nvPr/>
+        </p:nvSpPr>
+        <p:spPr>
+          <a:xfrm>
+            <a:off x="3134754" y="4430053"/>
+            <a:ext cx="305943" cy="369332"/>
+          </a:xfrm>
+          <a:prstGeom prst="rect">
+            <a:avLst/>
+          </a:prstGeom>
+          <a:noFill/>
+        </p:spPr>
+        <p:txBody>
+          <a:bodyPr wrap="none" rtlCol="0">
+            <a:spAutoFit/>
+          </a:bodyPr>
+          <a:lstStyle/>
+          <a:p>
+            <a:r>
+              <a:rPr lang="en-US" dirty="0" smtClean="0"/>
+              <a:t>d</a:t>
+            </a:r>
+            <a:endParaRPr lang="en-US" dirty="0"/>
+          </a:p>
+        </p:txBody>
+      </p:sp>
     </p:spTree>
     <p:extLst>
       <p:ext uri="{BB962C8B-B14F-4D97-AF65-F5344CB8AC3E}">
@@ -3278,7 +3437,7 @@
         </p:blipFill>
         <p:spPr>
           <a:xfrm>
-            <a:off x="1371600" y="5769710"/>
+            <a:off x="1371600" y="4488435"/>
             <a:ext cx="4114800" cy="3086100"/>
           </a:xfrm>
           <a:prstGeom prst="rect">
@@ -3302,7 +3461,7 @@
         </p:blipFill>
         <p:spPr>
           <a:xfrm>
-            <a:off x="1371600" y="2971334"/>
+            <a:off x="1371600" y="1555191"/>
             <a:ext cx="4114800" cy="3086100"/>
           </a:xfrm>
           <a:prstGeom prst="rect">
@@ -3312,33 +3471,286 @@
       </p:pic>
       <p:sp>
         <p:nvSpPr>
-          <p:cNvPr id="8" name="Title 7"/>
-          <p:cNvSpPr>
-            <a:spLocks noGrp="1"/>
-          </p:cNvSpPr>
-          <p:nvPr>
-            <p:ph type="title"/>
-          </p:nvPr>
-        </p:nvSpPr>
-        <p:spPr/>
+          <p:cNvPr id="6" name="Text Placeholder 6"/>
+          <p:cNvSpPr txBox="1">
+            <a:spLocks/>
+          </p:cNvSpPr>
+          <p:nvPr/>
+        </p:nvSpPr>
+        <p:spPr>
+          <a:xfrm>
+            <a:off x="207818" y="8691517"/>
+            <a:ext cx="6257636" cy="1162578"/>
+          </a:xfrm>
+          <a:prstGeom prst="rect">
+            <a:avLst/>
+          </a:prstGeom>
+        </p:spPr>
         <p:txBody>
           <a:bodyPr>
-            <a:normAutofit/>
+            <a:normAutofit lnSpcReduction="10000"/>
           </a:bodyPr>
-          <a:lstStyle/>
-          <a:p>
-            <a:r>
-              <a:rPr lang="en-US" sz="2000" dirty="0" smtClean="0"/>
-              <a:t>Supplementary Figure 2:</a:t>
+          <a:lstStyle>
+            <a:lvl1pPr marL="342900" indent="-342900" algn="l" defTabSz="457200" rtl="0" eaLnBrk="1" latinLnBrk="0" hangingPunct="1">
+              <a:spcBef>
+                <a:spcPct val="20000"/>
+              </a:spcBef>
+              <a:buFont typeface="Arial"/>
+              <a:buChar char="•"/>
+              <a:defRPr sz="3200" kern="1200">
+                <a:solidFill>
+                  <a:schemeClr val="tx1"/>
+                </a:solidFill>
+                <a:latin typeface="+mn-lt"/>
+                <a:ea typeface="+mn-ea"/>
+                <a:cs typeface="+mn-cs"/>
+              </a:defRPr>
+            </a:lvl1pPr>
+            <a:lvl2pPr marL="742950" indent="-285750" algn="l" defTabSz="457200" rtl="0" eaLnBrk="1" latinLnBrk="0" hangingPunct="1">
+              <a:spcBef>
+                <a:spcPct val="20000"/>
+              </a:spcBef>
+              <a:buFont typeface="Arial"/>
+              <a:buChar char="–"/>
+              <a:defRPr sz="2800" kern="1200">
+                <a:solidFill>
+                  <a:schemeClr val="tx1"/>
+                </a:solidFill>
+                <a:latin typeface="+mn-lt"/>
+                <a:ea typeface="+mn-ea"/>
+                <a:cs typeface="+mn-cs"/>
+              </a:defRPr>
+            </a:lvl2pPr>
+            <a:lvl3pPr marL="1143000" indent="-228600" algn="l" defTabSz="457200" rtl="0" eaLnBrk="1" latinLnBrk="0" hangingPunct="1">
+              <a:spcBef>
+                <a:spcPct val="20000"/>
+              </a:spcBef>
+              <a:buFont typeface="Arial"/>
+              <a:buChar char="•"/>
+              <a:defRPr sz="2400" kern="1200">
+                <a:solidFill>
+                  <a:schemeClr val="tx1"/>
+                </a:solidFill>
+                <a:latin typeface="+mn-lt"/>
+                <a:ea typeface="+mn-ea"/>
+                <a:cs typeface="+mn-cs"/>
+              </a:defRPr>
+            </a:lvl3pPr>
+            <a:lvl4pPr marL="1600200" indent="-228600" algn="l" defTabSz="457200" rtl="0" eaLnBrk="1" latinLnBrk="0" hangingPunct="1">
+              <a:spcBef>
+                <a:spcPct val="20000"/>
+              </a:spcBef>
+              <a:buFont typeface="Arial"/>
+              <a:buChar char="–"/>
+              <a:defRPr sz="2000" kern="1200">
+                <a:solidFill>
+                  <a:schemeClr val="tx1"/>
+                </a:solidFill>
+                <a:latin typeface="+mn-lt"/>
+                <a:ea typeface="+mn-ea"/>
+                <a:cs typeface="+mn-cs"/>
+              </a:defRPr>
+            </a:lvl4pPr>
+            <a:lvl5pPr marL="2057400" indent="-228600" algn="l" defTabSz="457200" rtl="0" eaLnBrk="1" latinLnBrk="0" hangingPunct="1">
+              <a:spcBef>
+                <a:spcPct val="20000"/>
+              </a:spcBef>
+              <a:buFont typeface="Arial"/>
+              <a:buChar char="»"/>
+              <a:defRPr sz="2000" kern="1200">
+                <a:solidFill>
+                  <a:schemeClr val="tx1"/>
+                </a:solidFill>
+                <a:latin typeface="+mn-lt"/>
+                <a:ea typeface="+mn-ea"/>
+                <a:cs typeface="+mn-cs"/>
+              </a:defRPr>
+            </a:lvl5pPr>
+            <a:lvl6pPr marL="2514600" indent="-228600" algn="l" defTabSz="457200" rtl="0" eaLnBrk="1" latinLnBrk="0" hangingPunct="1">
+              <a:spcBef>
+                <a:spcPct val="20000"/>
+              </a:spcBef>
+              <a:buFont typeface="Arial"/>
+              <a:buChar char="•"/>
+              <a:defRPr sz="2000" kern="1200">
+                <a:solidFill>
+                  <a:schemeClr val="tx1"/>
+                </a:solidFill>
+                <a:latin typeface="+mn-lt"/>
+                <a:ea typeface="+mn-ea"/>
+                <a:cs typeface="+mn-cs"/>
+              </a:defRPr>
+            </a:lvl6pPr>
+            <a:lvl7pPr marL="2971800" indent="-228600" algn="l" defTabSz="457200" rtl="0" eaLnBrk="1" latinLnBrk="0" hangingPunct="1">
+              <a:spcBef>
+                <a:spcPct val="20000"/>
+              </a:spcBef>
+              <a:buFont typeface="Arial"/>
+              <a:buChar char="•"/>
+              <a:defRPr sz="2000" kern="1200">
+                <a:solidFill>
+                  <a:schemeClr val="tx1"/>
+                </a:solidFill>
+                <a:latin typeface="+mn-lt"/>
+                <a:ea typeface="+mn-ea"/>
+                <a:cs typeface="+mn-cs"/>
+              </a:defRPr>
+            </a:lvl7pPr>
+            <a:lvl8pPr marL="3429000" indent="-228600" algn="l" defTabSz="457200" rtl="0" eaLnBrk="1" latinLnBrk="0" hangingPunct="1">
+              <a:spcBef>
+                <a:spcPct val="20000"/>
+              </a:spcBef>
+              <a:buFont typeface="Arial"/>
+              <a:buChar char="•"/>
+              <a:defRPr sz="2000" kern="1200">
+                <a:solidFill>
+                  <a:schemeClr val="tx1"/>
+                </a:solidFill>
+                <a:latin typeface="+mn-lt"/>
+                <a:ea typeface="+mn-ea"/>
+                <a:cs typeface="+mn-cs"/>
+              </a:defRPr>
+            </a:lvl8pPr>
+            <a:lvl9pPr marL="3886200" indent="-228600" algn="l" defTabSz="457200" rtl="0" eaLnBrk="1" latinLnBrk="0" hangingPunct="1">
+              <a:spcBef>
+                <a:spcPct val="20000"/>
+              </a:spcBef>
+              <a:buFont typeface="Arial"/>
+              <a:buChar char="•"/>
+              <a:defRPr sz="2000" kern="1200">
+                <a:solidFill>
+                  <a:schemeClr val="tx1"/>
+                </a:solidFill>
+                <a:latin typeface="+mn-lt"/>
+                <a:ea typeface="+mn-ea"/>
+                <a:cs typeface="+mn-cs"/>
+              </a:defRPr>
+            </a:lvl9pPr>
+          </a:lstStyle>
+          <a:p>
+            <a:pPr marL="0" indent="0">
+              <a:buNone/>
+            </a:pPr>
+            <a:r>
+              <a:rPr lang="en-US" sz="1200" b="1" dirty="0" smtClean="0"/>
+              <a:t>Supplementary Figure S2</a:t>
             </a:r>
             <a:br>
-              <a:rPr lang="en-US" sz="2000" dirty="0" smtClean="0"/>
+              <a:rPr lang="en-US" sz="1200" b="1" dirty="0" smtClean="0"/>
             </a:br>
             <a:r>
-              <a:rPr lang="en-US" sz="2000" dirty="0" smtClean="0"/>
-              <a:t>Random effects models using different sets of interaction terms</a:t>
-            </a:r>
-            <a:endParaRPr lang="en-US" sz="2000" dirty="0"/>
+              <a:rPr lang="en-US" sz="1200" dirty="0" smtClean="0"/>
+              <a:t>Evaluation of random effects models with additional interaction terms. Main = main effects only. </a:t>
+            </a:r>
+            <a:r>
+              <a:rPr lang="en-US" sz="1200" dirty="0" err="1" smtClean="0"/>
+              <a:t>AllInt</a:t>
+            </a:r>
+            <a:r>
+              <a:rPr lang="en-US" sz="1200" dirty="0" smtClean="0"/>
+              <a:t> = interaction terms for all variable categories. </a:t>
+            </a:r>
+            <a:r>
+              <a:rPr lang="en-US" sz="1200" dirty="0" err="1" smtClean="0"/>
+              <a:t>AllIntCentred</a:t>
+            </a:r>
+            <a:r>
+              <a:rPr lang="en-US" sz="1200" dirty="0" smtClean="0"/>
+              <a:t> = interaction terms for all variable types with mean fixed at 0. </a:t>
+            </a:r>
+            <a:r>
+              <a:rPr lang="en-US" sz="1200" dirty="0" err="1" smtClean="0"/>
+              <a:t>GeneGene</a:t>
+            </a:r>
+            <a:r>
+              <a:rPr lang="en-US" sz="1200" dirty="0" smtClean="0"/>
+              <a:t>: </a:t>
+            </a:r>
+            <a:r>
+              <a:rPr lang="en-US" sz="1200" dirty="0" err="1" smtClean="0"/>
+              <a:t>Gene:gene</a:t>
+            </a:r>
+            <a:r>
+              <a:rPr lang="en-US" sz="1200" dirty="0" smtClean="0"/>
+              <a:t> interaction terms only. </a:t>
+            </a:r>
+            <a:r>
+              <a:rPr lang="en-US" sz="1200" dirty="0" err="1" smtClean="0"/>
+              <a:t>GeneGeneCentred</a:t>
+            </a:r>
+            <a:r>
+              <a:rPr lang="en-US" sz="1200" dirty="0" smtClean="0"/>
+              <a:t>: </a:t>
+            </a:r>
+            <a:r>
+              <a:rPr lang="en-US" sz="1200" dirty="0" err="1" smtClean="0"/>
+              <a:t>gene:gene</a:t>
+            </a:r>
+            <a:r>
+              <a:rPr lang="en-US" sz="1200" dirty="0" smtClean="0"/>
+              <a:t> interaction terms with mean 0. a) Concordance for 100 random cross-validation splits. b) ranks of the different model in each split </a:t>
+            </a:r>
+            <a:endParaRPr lang="en-US" sz="1200" dirty="0"/>
+          </a:p>
+        </p:txBody>
+      </p:sp>
+      <p:sp>
+        <p:nvSpPr>
+          <p:cNvPr id="3" name="TextBox 2"/>
+          <p:cNvSpPr txBox="1"/>
+          <p:nvPr/>
+        </p:nvSpPr>
+        <p:spPr>
+          <a:xfrm>
+            <a:off x="663043" y="4990230"/>
+            <a:ext cx="305943" cy="369332"/>
+          </a:xfrm>
+          <a:prstGeom prst="rect">
+            <a:avLst/>
+          </a:prstGeom>
+          <a:noFill/>
+        </p:spPr>
+        <p:txBody>
+          <a:bodyPr wrap="none" rtlCol="0">
+            <a:spAutoFit/>
+          </a:bodyPr>
+          <a:lstStyle/>
+          <a:p>
+            <a:r>
+              <a:rPr lang="en-US" dirty="0" smtClean="0"/>
+              <a:t>b</a:t>
+            </a:r>
+            <a:endParaRPr lang="en-US" dirty="0"/>
+          </a:p>
+        </p:txBody>
+      </p:sp>
+      <p:sp>
+        <p:nvSpPr>
+          <p:cNvPr id="9" name="TextBox 8"/>
+          <p:cNvSpPr txBox="1"/>
+          <p:nvPr/>
+        </p:nvSpPr>
+        <p:spPr>
+          <a:xfrm>
+            <a:off x="663043" y="1505393"/>
+            <a:ext cx="295236" cy="369332"/>
+          </a:xfrm>
+          <a:prstGeom prst="rect">
+            <a:avLst/>
+          </a:prstGeom>
+          <a:noFill/>
+        </p:spPr>
+        <p:txBody>
+          <a:bodyPr wrap="none" rtlCol="0">
+            <a:spAutoFit/>
+          </a:bodyPr>
+          <a:lstStyle/>
+          <a:p>
+            <a:r>
+              <a:rPr lang="en-US" dirty="0" smtClean="0"/>
+              <a:t>a</a:t>
+            </a:r>
+            <a:endParaRPr lang="en-US" dirty="0"/>
           </a:p>
         </p:txBody>
       </p:sp>
@@ -3374,53 +3786,184 @@
       </p:grpSpPr>
       <p:sp>
         <p:nvSpPr>
-          <p:cNvPr id="8" name="Title 7"/>
-          <p:cNvSpPr>
-            <a:spLocks noGrp="1"/>
-          </p:cNvSpPr>
-          <p:nvPr>
-            <p:ph type="title"/>
-          </p:nvPr>
-        </p:nvSpPr>
-        <p:spPr/>
+          <p:cNvPr id="4" name="Text Placeholder 6"/>
+          <p:cNvSpPr txBox="1">
+            <a:spLocks/>
+          </p:cNvSpPr>
+          <p:nvPr/>
+        </p:nvSpPr>
+        <p:spPr>
+          <a:xfrm>
+            <a:off x="207818" y="8575553"/>
+            <a:ext cx="6257636" cy="1056490"/>
+          </a:xfrm>
+          <a:prstGeom prst="rect">
+            <a:avLst/>
+          </a:prstGeom>
+        </p:spPr>
         <p:txBody>
           <a:bodyPr>
             <a:normAutofit/>
           </a:bodyPr>
-          <a:lstStyle/>
-          <a:p>
-            <a:r>
-              <a:rPr lang="en-US" sz="2000" dirty="0" smtClean="0"/>
-              <a:t>Supplementary Figure 3</a:t>
+          <a:lstStyle>
+            <a:lvl1pPr marL="342900" indent="-342900" algn="l" defTabSz="457200" rtl="0" eaLnBrk="1" latinLnBrk="0" hangingPunct="1">
+              <a:spcBef>
+                <a:spcPct val="20000"/>
+              </a:spcBef>
+              <a:buFont typeface="Arial"/>
+              <a:buChar char="•"/>
+              <a:defRPr sz="3200" kern="1200">
+                <a:solidFill>
+                  <a:schemeClr val="tx1"/>
+                </a:solidFill>
+                <a:latin typeface="+mn-lt"/>
+                <a:ea typeface="+mn-ea"/>
+                <a:cs typeface="+mn-cs"/>
+              </a:defRPr>
+            </a:lvl1pPr>
+            <a:lvl2pPr marL="742950" indent="-285750" algn="l" defTabSz="457200" rtl="0" eaLnBrk="1" latinLnBrk="0" hangingPunct="1">
+              <a:spcBef>
+                <a:spcPct val="20000"/>
+              </a:spcBef>
+              <a:buFont typeface="Arial"/>
+              <a:buChar char="–"/>
+              <a:defRPr sz="2800" kern="1200">
+                <a:solidFill>
+                  <a:schemeClr val="tx1"/>
+                </a:solidFill>
+                <a:latin typeface="+mn-lt"/>
+                <a:ea typeface="+mn-ea"/>
+                <a:cs typeface="+mn-cs"/>
+              </a:defRPr>
+            </a:lvl2pPr>
+            <a:lvl3pPr marL="1143000" indent="-228600" algn="l" defTabSz="457200" rtl="0" eaLnBrk="1" latinLnBrk="0" hangingPunct="1">
+              <a:spcBef>
+                <a:spcPct val="20000"/>
+              </a:spcBef>
+              <a:buFont typeface="Arial"/>
+              <a:buChar char="•"/>
+              <a:defRPr sz="2400" kern="1200">
+                <a:solidFill>
+                  <a:schemeClr val="tx1"/>
+                </a:solidFill>
+                <a:latin typeface="+mn-lt"/>
+                <a:ea typeface="+mn-ea"/>
+                <a:cs typeface="+mn-cs"/>
+              </a:defRPr>
+            </a:lvl3pPr>
+            <a:lvl4pPr marL="1600200" indent="-228600" algn="l" defTabSz="457200" rtl="0" eaLnBrk="1" latinLnBrk="0" hangingPunct="1">
+              <a:spcBef>
+                <a:spcPct val="20000"/>
+              </a:spcBef>
+              <a:buFont typeface="Arial"/>
+              <a:buChar char="–"/>
+              <a:defRPr sz="2000" kern="1200">
+                <a:solidFill>
+                  <a:schemeClr val="tx1"/>
+                </a:solidFill>
+                <a:latin typeface="+mn-lt"/>
+                <a:ea typeface="+mn-ea"/>
+                <a:cs typeface="+mn-cs"/>
+              </a:defRPr>
+            </a:lvl4pPr>
+            <a:lvl5pPr marL="2057400" indent="-228600" algn="l" defTabSz="457200" rtl="0" eaLnBrk="1" latinLnBrk="0" hangingPunct="1">
+              <a:spcBef>
+                <a:spcPct val="20000"/>
+              </a:spcBef>
+              <a:buFont typeface="Arial"/>
+              <a:buChar char="»"/>
+              <a:defRPr sz="2000" kern="1200">
+                <a:solidFill>
+                  <a:schemeClr val="tx1"/>
+                </a:solidFill>
+                <a:latin typeface="+mn-lt"/>
+                <a:ea typeface="+mn-ea"/>
+                <a:cs typeface="+mn-cs"/>
+              </a:defRPr>
+            </a:lvl5pPr>
+            <a:lvl6pPr marL="2514600" indent="-228600" algn="l" defTabSz="457200" rtl="0" eaLnBrk="1" latinLnBrk="0" hangingPunct="1">
+              <a:spcBef>
+                <a:spcPct val="20000"/>
+              </a:spcBef>
+              <a:buFont typeface="Arial"/>
+              <a:buChar char="•"/>
+              <a:defRPr sz="2000" kern="1200">
+                <a:solidFill>
+                  <a:schemeClr val="tx1"/>
+                </a:solidFill>
+                <a:latin typeface="+mn-lt"/>
+                <a:ea typeface="+mn-ea"/>
+                <a:cs typeface="+mn-cs"/>
+              </a:defRPr>
+            </a:lvl6pPr>
+            <a:lvl7pPr marL="2971800" indent="-228600" algn="l" defTabSz="457200" rtl="0" eaLnBrk="1" latinLnBrk="0" hangingPunct="1">
+              <a:spcBef>
+                <a:spcPct val="20000"/>
+              </a:spcBef>
+              <a:buFont typeface="Arial"/>
+              <a:buChar char="•"/>
+              <a:defRPr sz="2000" kern="1200">
+                <a:solidFill>
+                  <a:schemeClr val="tx1"/>
+                </a:solidFill>
+                <a:latin typeface="+mn-lt"/>
+                <a:ea typeface="+mn-ea"/>
+                <a:cs typeface="+mn-cs"/>
+              </a:defRPr>
+            </a:lvl7pPr>
+            <a:lvl8pPr marL="3429000" indent="-228600" algn="l" defTabSz="457200" rtl="0" eaLnBrk="1" latinLnBrk="0" hangingPunct="1">
+              <a:spcBef>
+                <a:spcPct val="20000"/>
+              </a:spcBef>
+              <a:buFont typeface="Arial"/>
+              <a:buChar char="•"/>
+              <a:defRPr sz="2000" kern="1200">
+                <a:solidFill>
+                  <a:schemeClr val="tx1"/>
+                </a:solidFill>
+                <a:latin typeface="+mn-lt"/>
+                <a:ea typeface="+mn-ea"/>
+                <a:cs typeface="+mn-cs"/>
+              </a:defRPr>
+            </a:lvl8pPr>
+            <a:lvl9pPr marL="3886200" indent="-228600" algn="l" defTabSz="457200" rtl="0" eaLnBrk="1" latinLnBrk="0" hangingPunct="1">
+              <a:spcBef>
+                <a:spcPct val="20000"/>
+              </a:spcBef>
+              <a:buFont typeface="Arial"/>
+              <a:buChar char="•"/>
+              <a:defRPr sz="2000" kern="1200">
+                <a:solidFill>
+                  <a:schemeClr val="tx1"/>
+                </a:solidFill>
+                <a:latin typeface="+mn-lt"/>
+                <a:ea typeface="+mn-ea"/>
+                <a:cs typeface="+mn-cs"/>
+              </a:defRPr>
+            </a:lvl9pPr>
+          </a:lstStyle>
+          <a:p>
+            <a:pPr marL="0" indent="0">
+              <a:buNone/>
+            </a:pPr>
+            <a:r>
+              <a:rPr lang="en-US" sz="1200" b="1" dirty="0" smtClean="0"/>
+              <a:t>Supplementary Figure S3</a:t>
             </a:r>
             <a:br>
-              <a:rPr lang="en-US" sz="2000" dirty="0" smtClean="0"/>
+              <a:rPr lang="en-US" sz="1200" b="1" dirty="0" smtClean="0"/>
             </a:br>
             <a:r>
-              <a:rPr lang="en-US" sz="2000" dirty="0" smtClean="0"/>
-              <a:t>Accuracy of absolute risk predictions</a:t>
-            </a:r>
-            <a:br>
-              <a:rPr lang="en-US" sz="2000" dirty="0" smtClean="0"/>
-            </a:br>
-            <a:r>
-              <a:rPr lang="en-US" sz="2000" dirty="0" smtClean="0"/>
-              <a:t>a. Shows for different risk estimates at 365 days</a:t>
-            </a:r>
-            <a:br>
-              <a:rPr lang="en-US" sz="2000" dirty="0" smtClean="0"/>
-            </a:br>
-            <a:r>
-              <a:rPr lang="en-US" sz="2000" dirty="0" smtClean="0"/>
-              <a:t>b. Test and training errors; cross-validated</a:t>
-            </a:r>
-            <a:endParaRPr lang="en-US" sz="2000" dirty="0"/>
+              <a:rPr lang="en-US" sz="1200" dirty="0" smtClean="0"/>
+              <a:t>Accuracy of multistage predictions. a) concordance as a function of time (days after diagnosis). b) corresponding AUC. Data shown are for 10 10-fold cross-validation splits, each training splitting the data into 1/10ths, training the model on all possible 9/10 and evaluating on the remaining 1/10.</a:t>
+            </a:r>
+            <a:endParaRPr lang="en-US" sz="1200" dirty="0"/>
           </a:p>
         </p:txBody>
       </p:sp>
       <p:pic>
         <p:nvPicPr>
-          <p:cNvPr id="2" name="Picture 1"/>
+          <p:cNvPr id="5" name="Picture 4"/>
           <p:cNvPicPr>
             <a:picLocks noChangeAspect="1"/>
           </p:cNvPicPr>
@@ -3434,8 +3977,8 @@
         </p:blipFill>
         <p:spPr>
           <a:xfrm>
-            <a:off x="1847958" y="2376923"/>
-            <a:ext cx="2949410" cy="2949410"/>
+            <a:off x="1221754" y="576618"/>
+            <a:ext cx="3683059" cy="3683059"/>
           </a:xfrm>
           <a:prstGeom prst="rect">
             <a:avLst/>
@@ -3444,7 +3987,7 @@
       </p:pic>
       <p:pic>
         <p:nvPicPr>
-          <p:cNvPr id="3" name="Picture 2"/>
+          <p:cNvPr id="6" name="Picture 5"/>
           <p:cNvPicPr>
             <a:picLocks noChangeAspect="1"/>
           </p:cNvPicPr>
@@ -3458,42 +4001,77 @@
         </p:blipFill>
         <p:spPr>
           <a:xfrm>
-            <a:off x="342900" y="5992097"/>
-            <a:ext cx="3199273" cy="3199273"/>
+            <a:off x="1221754" y="4465402"/>
+            <a:ext cx="3683059" cy="3683059"/>
           </a:xfrm>
           <a:prstGeom prst="rect">
             <a:avLst/>
           </a:prstGeom>
         </p:spPr>
       </p:pic>
-      <p:pic>
-        <p:nvPicPr>
-          <p:cNvPr id="5" name="Picture 4"/>
-          <p:cNvPicPr>
-            <a:picLocks noChangeAspect="1"/>
-          </p:cNvPicPr>
+      <p:sp>
+        <p:nvSpPr>
+          <p:cNvPr id="7" name="TextBox 6"/>
+          <p:cNvSpPr txBox="1"/>
           <p:nvPr/>
-        </p:nvPicPr>
-        <p:blipFill>
-          <a:blip r:embed="rId4"/>
-          <a:stretch>
-            <a:fillRect/>
-          </a:stretch>
-        </p:blipFill>
-        <p:spPr>
-          <a:xfrm>
-            <a:off x="3542173" y="6039129"/>
-            <a:ext cx="3041991" cy="3041991"/>
+        </p:nvSpPr>
+        <p:spPr>
+          <a:xfrm>
+            <a:off x="539425" y="1067729"/>
+            <a:ext cx="295236" cy="369332"/>
           </a:xfrm>
           <a:prstGeom prst="rect">
             <a:avLst/>
           </a:prstGeom>
-        </p:spPr>
-      </p:pic>
+          <a:noFill/>
+        </p:spPr>
+        <p:txBody>
+          <a:bodyPr wrap="none" rtlCol="0">
+            <a:spAutoFit/>
+          </a:bodyPr>
+          <a:lstStyle/>
+          <a:p>
+            <a:r>
+              <a:rPr lang="en-US" dirty="0" smtClean="0"/>
+              <a:t>a</a:t>
+            </a:r>
+            <a:endParaRPr lang="en-US" dirty="0"/>
+          </a:p>
+        </p:txBody>
+      </p:sp>
+      <p:sp>
+        <p:nvSpPr>
+          <p:cNvPr id="8" name="TextBox 7"/>
+          <p:cNvSpPr txBox="1"/>
+          <p:nvPr/>
+        </p:nvSpPr>
+        <p:spPr>
+          <a:xfrm>
+            <a:off x="528718" y="4720488"/>
+            <a:ext cx="305943" cy="369332"/>
+          </a:xfrm>
+          <a:prstGeom prst="rect">
+            <a:avLst/>
+          </a:prstGeom>
+          <a:noFill/>
+        </p:spPr>
+        <p:txBody>
+          <a:bodyPr wrap="none" rtlCol="0">
+            <a:spAutoFit/>
+          </a:bodyPr>
+          <a:lstStyle/>
+          <a:p>
+            <a:r>
+              <a:rPr lang="en-US" dirty="0"/>
+              <a:t>b</a:t>
+            </a:r>
+          </a:p>
+        </p:txBody>
+      </p:sp>
     </p:spTree>
     <p:extLst>
       <p:ext uri="{BB962C8B-B14F-4D97-AF65-F5344CB8AC3E}">
-        <p14:creationId xmlns:p14="http://schemas.microsoft.com/office/powerpoint/2010/main" val="2595244727"/>
+        <p14:creationId xmlns:p14="http://schemas.microsoft.com/office/powerpoint/2010/main" val="968990691"/>
       </p:ext>
     </p:extLst>
   </p:cSld>
@@ -3522,43 +4100,192 @@
       </p:grpSpPr>
       <p:sp>
         <p:nvSpPr>
-          <p:cNvPr id="8" name="Title 7"/>
-          <p:cNvSpPr>
-            <a:spLocks noGrp="1"/>
-          </p:cNvSpPr>
-          <p:nvPr>
-            <p:ph type="title"/>
-          </p:nvPr>
-        </p:nvSpPr>
-        <p:spPr/>
+          <p:cNvPr id="4" name="Text Placeholder 6"/>
+          <p:cNvSpPr txBox="1">
+            <a:spLocks/>
+          </p:cNvSpPr>
+          <p:nvPr/>
+        </p:nvSpPr>
+        <p:spPr>
+          <a:xfrm>
+            <a:off x="207818" y="8691517"/>
+            <a:ext cx="6257636" cy="1162578"/>
+          </a:xfrm>
+          <a:prstGeom prst="rect">
+            <a:avLst/>
+          </a:prstGeom>
+        </p:spPr>
         <p:txBody>
           <a:bodyPr>
             <a:normAutofit/>
           </a:bodyPr>
-          <a:lstStyle/>
-          <a:p>
-            <a:r>
-              <a:rPr lang="en-US" sz="2000" dirty="0" smtClean="0"/>
-              <a:t>Supplementary Figure 4</a:t>
+          <a:lstStyle>
+            <a:lvl1pPr marL="342900" indent="-342900" algn="l" defTabSz="457200" rtl="0" eaLnBrk="1" latinLnBrk="0" hangingPunct="1">
+              <a:spcBef>
+                <a:spcPct val="20000"/>
+              </a:spcBef>
+              <a:buFont typeface="Arial"/>
+              <a:buChar char="•"/>
+              <a:defRPr sz="3200" kern="1200">
+                <a:solidFill>
+                  <a:schemeClr val="tx1"/>
+                </a:solidFill>
+                <a:latin typeface="+mn-lt"/>
+                <a:ea typeface="+mn-ea"/>
+                <a:cs typeface="+mn-cs"/>
+              </a:defRPr>
+            </a:lvl1pPr>
+            <a:lvl2pPr marL="742950" indent="-285750" algn="l" defTabSz="457200" rtl="0" eaLnBrk="1" latinLnBrk="0" hangingPunct="1">
+              <a:spcBef>
+                <a:spcPct val="20000"/>
+              </a:spcBef>
+              <a:buFont typeface="Arial"/>
+              <a:buChar char="–"/>
+              <a:defRPr sz="2800" kern="1200">
+                <a:solidFill>
+                  <a:schemeClr val="tx1"/>
+                </a:solidFill>
+                <a:latin typeface="+mn-lt"/>
+                <a:ea typeface="+mn-ea"/>
+                <a:cs typeface="+mn-cs"/>
+              </a:defRPr>
+            </a:lvl2pPr>
+            <a:lvl3pPr marL="1143000" indent="-228600" algn="l" defTabSz="457200" rtl="0" eaLnBrk="1" latinLnBrk="0" hangingPunct="1">
+              <a:spcBef>
+                <a:spcPct val="20000"/>
+              </a:spcBef>
+              <a:buFont typeface="Arial"/>
+              <a:buChar char="•"/>
+              <a:defRPr sz="2400" kern="1200">
+                <a:solidFill>
+                  <a:schemeClr val="tx1"/>
+                </a:solidFill>
+                <a:latin typeface="+mn-lt"/>
+                <a:ea typeface="+mn-ea"/>
+                <a:cs typeface="+mn-cs"/>
+              </a:defRPr>
+            </a:lvl3pPr>
+            <a:lvl4pPr marL="1600200" indent="-228600" algn="l" defTabSz="457200" rtl="0" eaLnBrk="1" latinLnBrk="0" hangingPunct="1">
+              <a:spcBef>
+                <a:spcPct val="20000"/>
+              </a:spcBef>
+              <a:buFont typeface="Arial"/>
+              <a:buChar char="–"/>
+              <a:defRPr sz="2000" kern="1200">
+                <a:solidFill>
+                  <a:schemeClr val="tx1"/>
+                </a:solidFill>
+                <a:latin typeface="+mn-lt"/>
+                <a:ea typeface="+mn-ea"/>
+                <a:cs typeface="+mn-cs"/>
+              </a:defRPr>
+            </a:lvl4pPr>
+            <a:lvl5pPr marL="2057400" indent="-228600" algn="l" defTabSz="457200" rtl="0" eaLnBrk="1" latinLnBrk="0" hangingPunct="1">
+              <a:spcBef>
+                <a:spcPct val="20000"/>
+              </a:spcBef>
+              <a:buFont typeface="Arial"/>
+              <a:buChar char="»"/>
+              <a:defRPr sz="2000" kern="1200">
+                <a:solidFill>
+                  <a:schemeClr val="tx1"/>
+                </a:solidFill>
+                <a:latin typeface="+mn-lt"/>
+                <a:ea typeface="+mn-ea"/>
+                <a:cs typeface="+mn-cs"/>
+              </a:defRPr>
+            </a:lvl5pPr>
+            <a:lvl6pPr marL="2514600" indent="-228600" algn="l" defTabSz="457200" rtl="0" eaLnBrk="1" latinLnBrk="0" hangingPunct="1">
+              <a:spcBef>
+                <a:spcPct val="20000"/>
+              </a:spcBef>
+              <a:buFont typeface="Arial"/>
+              <a:buChar char="•"/>
+              <a:defRPr sz="2000" kern="1200">
+                <a:solidFill>
+                  <a:schemeClr val="tx1"/>
+                </a:solidFill>
+                <a:latin typeface="+mn-lt"/>
+                <a:ea typeface="+mn-ea"/>
+                <a:cs typeface="+mn-cs"/>
+              </a:defRPr>
+            </a:lvl6pPr>
+            <a:lvl7pPr marL="2971800" indent="-228600" algn="l" defTabSz="457200" rtl="0" eaLnBrk="1" latinLnBrk="0" hangingPunct="1">
+              <a:spcBef>
+                <a:spcPct val="20000"/>
+              </a:spcBef>
+              <a:buFont typeface="Arial"/>
+              <a:buChar char="•"/>
+              <a:defRPr sz="2000" kern="1200">
+                <a:solidFill>
+                  <a:schemeClr val="tx1"/>
+                </a:solidFill>
+                <a:latin typeface="+mn-lt"/>
+                <a:ea typeface="+mn-ea"/>
+                <a:cs typeface="+mn-cs"/>
+              </a:defRPr>
+            </a:lvl7pPr>
+            <a:lvl8pPr marL="3429000" indent="-228600" algn="l" defTabSz="457200" rtl="0" eaLnBrk="1" latinLnBrk="0" hangingPunct="1">
+              <a:spcBef>
+                <a:spcPct val="20000"/>
+              </a:spcBef>
+              <a:buFont typeface="Arial"/>
+              <a:buChar char="•"/>
+              <a:defRPr sz="2000" kern="1200">
+                <a:solidFill>
+                  <a:schemeClr val="tx1"/>
+                </a:solidFill>
+                <a:latin typeface="+mn-lt"/>
+                <a:ea typeface="+mn-ea"/>
+                <a:cs typeface="+mn-cs"/>
+              </a:defRPr>
+            </a:lvl8pPr>
+            <a:lvl9pPr marL="3886200" indent="-228600" algn="l" defTabSz="457200" rtl="0" eaLnBrk="1" latinLnBrk="0" hangingPunct="1">
+              <a:spcBef>
+                <a:spcPct val="20000"/>
+              </a:spcBef>
+              <a:buFont typeface="Arial"/>
+              <a:buChar char="•"/>
+              <a:defRPr sz="2000" kern="1200">
+                <a:solidFill>
+                  <a:schemeClr val="tx1"/>
+                </a:solidFill>
+                <a:latin typeface="+mn-lt"/>
+                <a:ea typeface="+mn-ea"/>
+                <a:cs typeface="+mn-cs"/>
+              </a:defRPr>
+            </a:lvl9pPr>
+          </a:lstStyle>
+          <a:p>
+            <a:pPr marL="0" indent="0">
+              <a:buNone/>
+            </a:pPr>
+            <a:r>
+              <a:rPr lang="en-US" sz="1200" b="1" dirty="0" smtClean="0"/>
+              <a:t>Supplementary Figure S4</a:t>
             </a:r>
             <a:br>
-              <a:rPr lang="en-US" sz="2000" dirty="0" smtClean="0"/>
+              <a:rPr lang="en-US" sz="1200" b="1" dirty="0" smtClean="0"/>
             </a:br>
             <a:r>
-              <a:rPr lang="en-US" sz="2000" dirty="0" smtClean="0"/>
-              <a:t>Distribution of P-values in simulations of different cohort and </a:t>
-            </a:r>
-            <a:r>
-              <a:rPr lang="en-US" sz="2000" smtClean="0"/>
-              <a:t>effect size.</a:t>
-            </a:r>
-            <a:endParaRPr lang="en-US" sz="2000" dirty="0"/>
+              <a:rPr lang="en-US" sz="1200" dirty="0" smtClean="0"/>
+              <a:t>Predicted outcome in a patient in PD11080, a 32yr old female with mutations in </a:t>
+            </a:r>
+            <a:r>
+              <a:rPr lang="en-US" sz="1200" i="1" dirty="0" smtClean="0"/>
+              <a:t>EZH2</a:t>
+            </a:r>
+            <a:r>
+              <a:rPr lang="en-US" sz="1200" dirty="0" smtClean="0"/>
+              <a:t> and t(6;9), which would be commonly associated with poor risk.  </a:t>
+            </a:r>
+            <a:endParaRPr lang="en-US" sz="1200" dirty="0"/>
           </a:p>
         </p:txBody>
       </p:sp>
       <p:pic>
         <p:nvPicPr>
-          <p:cNvPr id="2" name="Picture 1"/>
+          <p:cNvPr id="6" name="Picture 5"/>
           <p:cNvPicPr>
             <a:picLocks noChangeAspect="1"/>
           </p:cNvPicPr>
@@ -3572,18 +4299,161 @@
         </p:blipFill>
         <p:spPr>
           <a:xfrm>
-            <a:off x="1371600" y="2895600"/>
-            <a:ext cx="4114800" cy="4114800"/>
+            <a:off x="1624034" y="4566556"/>
+            <a:ext cx="3725262" cy="3104385"/>
           </a:xfrm>
           <a:prstGeom prst="rect">
             <a:avLst/>
           </a:prstGeom>
         </p:spPr>
       </p:pic>
+      <p:pic>
+        <p:nvPicPr>
+          <p:cNvPr id="7" name="Picture 6"/>
+          <p:cNvPicPr>
+            <a:picLocks noChangeAspect="1"/>
+          </p:cNvPicPr>
+          <p:nvPr/>
+        </p:nvPicPr>
+        <p:blipFill>
+          <a:blip r:embed="rId3"/>
+          <a:stretch>
+            <a:fillRect/>
+          </a:stretch>
+        </p:blipFill>
+        <p:spPr>
+          <a:xfrm>
+            <a:off x="1624034" y="902557"/>
+            <a:ext cx="3725262" cy="3104385"/>
+          </a:xfrm>
+          <a:prstGeom prst="rect">
+            <a:avLst/>
+          </a:prstGeom>
+        </p:spPr>
+      </p:pic>
+      <p:sp>
+        <p:nvSpPr>
+          <p:cNvPr id="8" name="TextBox 7"/>
+          <p:cNvSpPr txBox="1"/>
+          <p:nvPr/>
+        </p:nvSpPr>
+        <p:spPr>
+          <a:xfrm>
+            <a:off x="2219649" y="741791"/>
+            <a:ext cx="2904386" cy="276999"/>
+          </a:xfrm>
+          <a:prstGeom prst="rect">
+            <a:avLst/>
+          </a:prstGeom>
+          <a:noFill/>
+        </p:spPr>
+        <p:txBody>
+          <a:bodyPr wrap="none" rtlCol="0">
+            <a:spAutoFit/>
+          </a:bodyPr>
+          <a:lstStyle/>
+          <a:p>
+            <a:r>
+              <a:rPr lang="en-US" sz="1200" dirty="0" smtClean="0"/>
+              <a:t>Standard chemo with allograft after relapse </a:t>
+            </a:r>
+            <a:endParaRPr lang="en-US" sz="1200" dirty="0"/>
+          </a:p>
+        </p:txBody>
+      </p:sp>
+      <p:sp>
+        <p:nvSpPr>
+          <p:cNvPr id="9" name="TextBox 8"/>
+          <p:cNvSpPr txBox="1"/>
+          <p:nvPr/>
+        </p:nvSpPr>
+        <p:spPr>
+          <a:xfrm>
+            <a:off x="2219649" y="4289557"/>
+            <a:ext cx="1149398" cy="276999"/>
+          </a:xfrm>
+          <a:prstGeom prst="rect">
+            <a:avLst/>
+          </a:prstGeom>
+          <a:noFill/>
+        </p:spPr>
+        <p:txBody>
+          <a:bodyPr wrap="none" rtlCol="0">
+            <a:spAutoFit/>
+          </a:bodyPr>
+          <a:lstStyle/>
+          <a:p>
+            <a:r>
+              <a:rPr lang="en-US" sz="1200" dirty="0" smtClean="0"/>
+              <a:t>Allograft in CR1</a:t>
+            </a:r>
+            <a:endParaRPr lang="en-US" sz="1200" dirty="0"/>
+          </a:p>
+        </p:txBody>
+      </p:sp>
+      <p:sp>
+        <p:nvSpPr>
+          <p:cNvPr id="10" name="TextBox 9"/>
+          <p:cNvSpPr txBox="1"/>
+          <p:nvPr/>
+        </p:nvSpPr>
+        <p:spPr>
+          <a:xfrm>
+            <a:off x="943993" y="902557"/>
+            <a:ext cx="295236" cy="369332"/>
+          </a:xfrm>
+          <a:prstGeom prst="rect">
+            <a:avLst/>
+          </a:prstGeom>
+          <a:noFill/>
+        </p:spPr>
+        <p:txBody>
+          <a:bodyPr wrap="none" rtlCol="0">
+            <a:spAutoFit/>
+          </a:bodyPr>
+          <a:lstStyle/>
+          <a:p>
+            <a:r>
+              <a:rPr lang="en-US" dirty="0"/>
+              <a:t>a</a:t>
+            </a:r>
+          </a:p>
+        </p:txBody>
+      </p:sp>
+      <p:sp>
+        <p:nvSpPr>
+          <p:cNvPr id="11" name="TextBox 10"/>
+          <p:cNvSpPr txBox="1"/>
+          <p:nvPr/>
+        </p:nvSpPr>
+        <p:spPr>
+          <a:xfrm>
+            <a:off x="943993" y="4452309"/>
+            <a:ext cx="305943" cy="369332"/>
+          </a:xfrm>
+          <a:prstGeom prst="rect">
+            <a:avLst/>
+          </a:prstGeom>
+          <a:noFill/>
+        </p:spPr>
+        <p:txBody>
+          <a:bodyPr wrap="none" rtlCol="0">
+            <a:spAutoFit/>
+          </a:bodyPr>
+          <a:lstStyle/>
+          <a:p>
+            <a:r>
+              <a:rPr lang="en-US" dirty="0" smtClean="0"/>
+              <a:t>b</a:t>
+            </a:r>
+            <a:endParaRPr lang="en-US" dirty="0"/>
+          </a:p>
+        </p:txBody>
+      </p:sp>
     </p:spTree>
     <p:extLst>
       <p:ext uri="{BB962C8B-B14F-4D97-AF65-F5344CB8AC3E}">
-        <p14:creationId xmlns:p14="http://schemas.microsoft.com/office/powerpoint/2010/main" val="2212294842"/>
+        <p14:creationId xmlns:p14="http://schemas.microsoft.com/office/powerpoint/2010/main" val="2383584390"/>
       </p:ext>
     </p:extLst>
   </p:cSld>
@@ -3620,35 +4490,432 @@
             <p:ph type="title"/>
           </p:nvPr>
         </p:nvSpPr>
-        <p:spPr/>
-        <p:txBody>
-          <a:bodyPr>
+        <p:spPr>
+          <a:xfrm>
+            <a:off x="342900" y="8050633"/>
+            <a:ext cx="6172200" cy="1651000"/>
+          </a:xfrm>
+        </p:spPr>
+        <p:txBody>
+          <a:bodyPr anchor="t">
             <a:normAutofit/>
           </a:bodyPr>
           <a:lstStyle/>
           <a:p>
-            <a:r>
-              <a:rPr lang="en-US" sz="2000" dirty="0" smtClean="0"/>
-              <a:t>Supplementary </a:t>
-            </a:r>
-            <a:r>
-              <a:rPr lang="en-US" sz="2000" smtClean="0"/>
-              <a:t>Figure 3</a:t>
-            </a:r>
-            <a:endParaRPr lang="en-US" sz="2000" dirty="0"/>
-          </a:p>
-        </p:txBody>
-      </p:sp>
+            <a:pPr algn="l"/>
+            <a:r>
+              <a:rPr lang="en-US" sz="1200" b="1" dirty="0" smtClean="0"/>
+              <a:t>Supplementary Figure </a:t>
+            </a:r>
+            <a:r>
+              <a:rPr lang="en-US" sz="1200" b="1" dirty="0" smtClean="0"/>
+              <a:t>S</a:t>
+            </a:r>
+            <a:r>
+              <a:rPr lang="en-US" sz="1200" b="1" dirty="0" smtClean="0"/>
+              <a:t>5</a:t>
+            </a:r>
+            <a:r>
+              <a:rPr lang="en-US" sz="1200" b="1" dirty="0" smtClean="0"/>
+              <a:t/>
+            </a:r>
+            <a:br>
+              <a:rPr lang="en-US" sz="1200" b="1" dirty="0" smtClean="0"/>
+            </a:br>
+            <a:r>
+              <a:rPr lang="en-US" sz="1200" dirty="0" smtClean="0"/>
+              <a:t>Accuracy of absolute risk predictions</a:t>
+            </a:r>
+            <a:br>
+              <a:rPr lang="en-US" sz="1200" dirty="0" smtClean="0"/>
+            </a:br>
+            <a:r>
+              <a:rPr lang="en-US" sz="1200" dirty="0" smtClean="0"/>
+              <a:t>a. In-sample errors for the multistage model</a:t>
+            </a:r>
+            <a:br>
+              <a:rPr lang="en-US" sz="1200" dirty="0" smtClean="0"/>
+            </a:br>
+            <a:r>
+              <a:rPr lang="en-US" sz="1200" dirty="0" smtClean="0"/>
+              <a:t>b</a:t>
+            </a:r>
+            <a:r>
+              <a:rPr lang="en-US" sz="1200" dirty="0" smtClean="0"/>
+              <a:t>. </a:t>
+            </a:r>
+            <a:r>
+              <a:rPr lang="en-US" sz="1200" dirty="0" smtClean="0"/>
+              <a:t>Training errors for different stages. CIR: Relapses; PRS: Pos</a:t>
+            </a:r>
+            <a:r>
+              <a:rPr lang="en-US" sz="1200" dirty="0" smtClean="0"/>
+              <a:t>t-relapse survival; NRM: Non-relapse mortality; compared to OS: </a:t>
+            </a:r>
+            <a:r>
+              <a:rPr lang="en-US" sz="1200" dirty="0" err="1" smtClean="0"/>
+              <a:t>rfx</a:t>
+            </a:r>
+            <a:r>
+              <a:rPr lang="en-US" sz="1200" dirty="0" smtClean="0"/>
+              <a:t> regression on survival ;OS365: multistage prediction at 365 days; OS1000 multistage prediction at 1000 days. Distributions are shown for 100 random test/training splits 20:80.</a:t>
+            </a:r>
+            <a:br>
+              <a:rPr lang="en-US" sz="1200" dirty="0" smtClean="0"/>
+            </a:br>
+            <a:r>
+              <a:rPr lang="en-US" sz="1200" dirty="0" smtClean="0"/>
+              <a:t>c. Test errors, labels as in part b.</a:t>
+            </a:r>
+            <a:endParaRPr lang="en-US" sz="1200" dirty="0"/>
+          </a:p>
+        </p:txBody>
+      </p:sp>
+      <p:pic>
+        <p:nvPicPr>
+          <p:cNvPr id="3" name="Picture 2"/>
+          <p:cNvPicPr>
+            <a:picLocks noChangeAspect="1"/>
+          </p:cNvPicPr>
+          <p:nvPr/>
+        </p:nvPicPr>
+        <p:blipFill>
+          <a:blip r:embed="rId2"/>
+          <a:stretch>
+            <a:fillRect/>
+          </a:stretch>
+        </p:blipFill>
+        <p:spPr>
+          <a:xfrm>
+            <a:off x="3542173" y="4270819"/>
+            <a:ext cx="3199273" cy="3199273"/>
+          </a:xfrm>
+          <a:prstGeom prst="rect">
+            <a:avLst/>
+          </a:prstGeom>
+        </p:spPr>
+      </p:pic>
+      <p:pic>
+        <p:nvPicPr>
+          <p:cNvPr id="5" name="Picture 4"/>
+          <p:cNvPicPr>
+            <a:picLocks noChangeAspect="1"/>
+          </p:cNvPicPr>
+          <p:nvPr/>
+        </p:nvPicPr>
+        <p:blipFill>
+          <a:blip r:embed="rId3"/>
+          <a:stretch>
+            <a:fillRect/>
+          </a:stretch>
+        </p:blipFill>
+        <p:spPr>
+          <a:xfrm>
+            <a:off x="342900" y="4270819"/>
+            <a:ext cx="3199273" cy="3199273"/>
+          </a:xfrm>
+          <a:prstGeom prst="rect">
+            <a:avLst/>
+          </a:prstGeom>
+        </p:spPr>
+      </p:pic>
+      <p:pic>
+        <p:nvPicPr>
+          <p:cNvPr id="4" name="Picture 3"/>
+          <p:cNvPicPr>
+            <a:picLocks noChangeAspect="1"/>
+          </p:cNvPicPr>
+          <p:nvPr/>
+        </p:nvPicPr>
+        <p:blipFill rotWithShape="1">
+          <a:blip r:embed="rId4"/>
+          <a:srcRect t="3609"/>
+          <a:stretch/>
+        </p:blipFill>
+        <p:spPr>
+          <a:xfrm>
+            <a:off x="1421750" y="640638"/>
+            <a:ext cx="3392283" cy="3269834"/>
+          </a:xfrm>
+          <a:prstGeom prst="rect">
+            <a:avLst/>
+          </a:prstGeom>
+        </p:spPr>
+      </p:pic>
     </p:spTree>
     <p:extLst>
       <p:ext uri="{BB962C8B-B14F-4D97-AF65-F5344CB8AC3E}">
-        <p14:creationId xmlns:p14="http://schemas.microsoft.com/office/powerpoint/2010/main" val="2595438532"/>
+        <p14:creationId xmlns:p14="http://schemas.microsoft.com/office/powerpoint/2010/main" val="2595244727"/>
       </p:ext>
     </p:extLst>
   </p:cSld>
   <p:clrMapOvr>
     <a:masterClrMapping/>
   </p:clrMapOvr>
+</p:sld>
+</file>
+
+<file path=ppt/slides/slide6.xml><?xml version="1.0" encoding="utf-8"?>
+<p:sld xmlns:a="http://schemas.openxmlformats.org/drawingml/2006/main" xmlns:r="http://schemas.openxmlformats.org/officeDocument/2006/relationships" xmlns:p="http://schemas.openxmlformats.org/presentationml/2006/main">
+  <p:cSld>
+    <p:spTree>
+      <p:nvGrpSpPr>
+        <p:cNvPr id="1" name=""/>
+        <p:cNvGrpSpPr/>
+        <p:nvPr/>
+      </p:nvGrpSpPr>
+      <p:grpSpPr>
+        <a:xfrm>
+          <a:off x="0" y="0"/>
+          <a:ext cx="0" cy="0"/>
+          <a:chOff x="0" y="0"/>
+          <a:chExt cx="0" cy="0"/>
+        </a:xfrm>
+      </p:grpSpPr>
+      <p:sp>
+        <p:nvSpPr>
+          <p:cNvPr id="4" name="Title 7"/>
+          <p:cNvSpPr>
+            <a:spLocks noGrp="1"/>
+          </p:cNvSpPr>
+          <p:nvPr>
+            <p:ph type="title"/>
+          </p:nvPr>
+        </p:nvSpPr>
+        <p:spPr>
+          <a:xfrm>
+            <a:off x="342900" y="8766620"/>
+            <a:ext cx="6172200" cy="715987"/>
+          </a:xfrm>
+        </p:spPr>
+        <p:txBody>
+          <a:bodyPr anchor="t">
+            <a:normAutofit/>
+          </a:bodyPr>
+          <a:lstStyle/>
+          <a:p>
+            <a:pPr algn="l"/>
+            <a:r>
+              <a:rPr lang="en-US" sz="1200" b="1" dirty="0" smtClean="0"/>
+              <a:t>Supplementary Figure </a:t>
+            </a:r>
+            <a:r>
+              <a:rPr lang="en-US" sz="1200" b="1" dirty="0" smtClean="0"/>
+              <a:t>S6</a:t>
+            </a:r>
+            <a:r>
+              <a:rPr lang="en-US" sz="1200" b="1" dirty="0" smtClean="0"/>
+              <a:t/>
+            </a:r>
+            <a:br>
+              <a:rPr lang="en-US" sz="1200" b="1" dirty="0" smtClean="0"/>
+            </a:br>
+            <a:r>
+              <a:rPr lang="en-US" sz="1200" dirty="0" smtClean="0"/>
+              <a:t>Screenshot of the webserver, available at http://mg14-aml.sandbox.sanger.ac.uk/multisite</a:t>
+            </a:r>
+            <a:endParaRPr lang="en-US" sz="1200" dirty="0"/>
+          </a:p>
+        </p:txBody>
+      </p:sp>
+      <p:pic>
+        <p:nvPicPr>
+          <p:cNvPr id="5" name="Picture 4" descr="Screen Shot 2015-05-26 at 14.52.50.png"/>
+          <p:cNvPicPr>
+            <a:picLocks noChangeAspect="1"/>
+          </p:cNvPicPr>
+          <p:nvPr/>
+        </p:nvPicPr>
+        <p:blipFill>
+          <a:blip r:embed="rId2">
+            <a:extLst>
+              <a:ext uri="{28A0092B-C50C-407E-A947-70E740481C1C}">
+                <a14:useLocalDpi xmlns:a14="http://schemas.microsoft.com/office/drawing/2010/main" val="0"/>
+              </a:ext>
+            </a:extLst>
+          </a:blip>
+          <a:stretch>
+            <a:fillRect/>
+          </a:stretch>
+        </p:blipFill>
+        <p:spPr>
+          <a:xfrm>
+            <a:off x="89904" y="1978109"/>
+            <a:ext cx="6858000" cy="5547850"/>
+          </a:xfrm>
+          <a:prstGeom prst="rect">
+            <a:avLst/>
+          </a:prstGeom>
+        </p:spPr>
+      </p:pic>
+    </p:spTree>
+    <p:extLst>
+      <p:ext uri="{BB962C8B-B14F-4D97-AF65-F5344CB8AC3E}">
+        <p14:creationId xmlns:p14="http://schemas.microsoft.com/office/powerpoint/2010/main" val="1896804618"/>
+      </p:ext>
+    </p:extLst>
+  </p:cSld>
+  <p:clrMapOvr>
+    <a:masterClrMapping/>
+  </p:clrMapOvr>
+</p:sld>
+</file>
+
+<file path=ppt/slides/slide7.xml><?xml version="1.0" encoding="utf-8"?>
+<p:sld xmlns:a="http://schemas.openxmlformats.org/drawingml/2006/main" xmlns:r="http://schemas.openxmlformats.org/officeDocument/2006/relationships" xmlns:p="http://schemas.openxmlformats.org/presentationml/2006/main">
+  <p:cSld>
+    <p:spTree>
+      <p:nvGrpSpPr>
+        <p:cNvPr id="1" name=""/>
+        <p:cNvGrpSpPr/>
+        <p:nvPr/>
+      </p:nvGrpSpPr>
+      <p:grpSpPr>
+        <a:xfrm>
+          <a:off x="0" y="0"/>
+          <a:ext cx="0" cy="0"/>
+          <a:chOff x="0" y="0"/>
+          <a:chExt cx="0" cy="0"/>
+        </a:xfrm>
+      </p:grpSpPr>
+      <p:sp>
+        <p:nvSpPr>
+          <p:cNvPr id="5" name="Title 7"/>
+          <p:cNvSpPr>
+            <a:spLocks noGrp="1"/>
+          </p:cNvSpPr>
+          <p:nvPr>
+            <p:ph type="title"/>
+          </p:nvPr>
+        </p:nvSpPr>
+        <p:spPr>
+          <a:xfrm>
+            <a:off x="342900" y="8050633"/>
+            <a:ext cx="6172200" cy="1651000"/>
+          </a:xfrm>
+        </p:spPr>
+        <p:txBody>
+          <a:bodyPr anchor="b">
+            <a:normAutofit/>
+          </a:bodyPr>
+          <a:lstStyle/>
+          <a:p>
+            <a:pPr algn="l"/>
+            <a:r>
+              <a:rPr lang="en-US" sz="1200" b="1" dirty="0" smtClean="0"/>
+              <a:t>Supplementary Figure </a:t>
+            </a:r>
+            <a:r>
+              <a:rPr lang="en-US" sz="1200" b="1" dirty="0" smtClean="0"/>
+              <a:t>S7</a:t>
+            </a:r>
+            <a:r>
+              <a:rPr lang="en-US" sz="1200" b="1" dirty="0" smtClean="0"/>
+              <a:t/>
+            </a:r>
+            <a:br>
+              <a:rPr lang="en-US" sz="1200" b="1" dirty="0" smtClean="0"/>
+            </a:br>
+            <a:r>
+              <a:rPr lang="en-US" sz="1200" dirty="0" smtClean="0"/>
+              <a:t>Distribution of P-values (y-axis) in comprehensive simulations using 100 (+), 1000 (</a:t>
+            </a:r>
+            <a:r>
+              <a:rPr lang="en-US" sz="1200" dirty="0" err="1" smtClean="0"/>
+              <a:t>Δ</a:t>
+            </a:r>
+            <a:r>
+              <a:rPr lang="en-US" sz="1200" dirty="0" smtClean="0"/>
+              <a:t>), and 10000 simulated patients (o), respectively. P-values are shown as a function of the product of N (sample size) </a:t>
+            </a:r>
+            <a:r>
+              <a:rPr lang="en-US" sz="1200" dirty="0" err="1" smtClean="0"/>
+              <a:t>ψ</a:t>
+            </a:r>
+            <a:r>
+              <a:rPr lang="en-US" sz="1200" dirty="0" smtClean="0"/>
+              <a:t> (uncensored fraction) p (mutation frequency) and β</a:t>
+            </a:r>
+            <a:r>
+              <a:rPr lang="en-US" sz="1200" baseline="30000" dirty="0" smtClean="0"/>
+              <a:t>2 </a:t>
+            </a:r>
+            <a:r>
+              <a:rPr lang="en-US" sz="1200" dirty="0" smtClean="0"/>
+              <a:t>(squared log hazard) as indicated </a:t>
+            </a:r>
+            <a:r>
+              <a:rPr lang="en-US" sz="1200" dirty="0" smtClean="0"/>
+              <a:t>on the x-axis.</a:t>
+            </a:r>
+            <a:br>
+              <a:rPr lang="en-US" sz="1200" dirty="0" smtClean="0"/>
+            </a:br>
+            <a:r>
+              <a:rPr lang="en-US" sz="1200" dirty="0" smtClean="0"/>
+              <a:t>The solid lined indicates an analytical approximation by </a:t>
+            </a:r>
+            <a:r>
+              <a:rPr lang="en-US" sz="1200" dirty="0" err="1" smtClean="0"/>
+              <a:t>Schoenfeld</a:t>
+            </a:r>
+            <a:r>
+              <a:rPr lang="en-US" sz="1200" dirty="0" smtClean="0"/>
+              <a:t>, described in </a:t>
+            </a:r>
+            <a:r>
+              <a:rPr lang="en-US" sz="1200" dirty="0" err="1" smtClean="0"/>
+              <a:t>Schmoor</a:t>
+            </a:r>
+            <a:r>
+              <a:rPr lang="en-US" sz="1200" dirty="0" smtClean="0"/>
+              <a:t> (2000).</a:t>
+            </a:r>
+            <a:endParaRPr lang="en-US" sz="1200" dirty="0"/>
+          </a:p>
+        </p:txBody>
+      </p:sp>
+      <p:pic>
+        <p:nvPicPr>
+          <p:cNvPr id="4" name="Picture 3"/>
+          <p:cNvPicPr>
+            <a:picLocks noChangeAspect="1"/>
+          </p:cNvPicPr>
+          <p:nvPr/>
+        </p:nvPicPr>
+        <p:blipFill>
+          <a:blip r:embed="rId2"/>
+          <a:stretch>
+            <a:fillRect/>
+          </a:stretch>
+        </p:blipFill>
+        <p:spPr>
+          <a:xfrm>
+            <a:off x="1158077" y="2457269"/>
+            <a:ext cx="4114800" cy="4114800"/>
+          </a:xfrm>
+          <a:prstGeom prst="rect">
+            <a:avLst/>
+          </a:prstGeom>
+        </p:spPr>
+      </p:pic>
+    </p:spTree>
+    <p:extLst>
+      <p:ext uri="{BB962C8B-B14F-4D97-AF65-F5344CB8AC3E}">
+        <p14:creationId xmlns:p14="http://schemas.microsoft.com/office/powerpoint/2010/main" val="2212294842"/>
+      </p:ext>
+    </p:extLst>
+  </p:cSld>
+  <p:clrMapOvr>
+    <a:masterClrMapping/>
+  </p:clrMapOvr>
+  <p:timing>
+    <p:tnLst>
+      <p:par>
+        <p:cTn xmlns:p14="http://schemas.microsoft.com/office/powerpoint/2010/main" id="1" dur="indefinite" restart="never" nodeType="tmRoot"/>
+      </p:par>
+    </p:tnLst>
+  </p:timing>
 </p:sld>
 </file>
 

</xml_diff>